<commit_message>
*Added a picture to the powerpoint
</commit_message>
<xml_diff>
--- a/Milestone 4/Milestone 4 Presentation.pptx
+++ b/Milestone 4/Milestone 4 Presentation.pptx
@@ -9,9 +9,10 @@
     <p:sldId id="271" r:id="rId3"/>
     <p:sldId id="272" r:id="rId4"/>
     <p:sldId id="273" r:id="rId5"/>
-    <p:sldId id="257" r:id="rId6"/>
-    <p:sldId id="266" r:id="rId7"/>
-    <p:sldId id="258" r:id="rId8"/>
+    <p:sldId id="274" r:id="rId6"/>
+    <p:sldId id="257" r:id="rId7"/>
+    <p:sldId id="266" r:id="rId8"/>
+    <p:sldId id="258" r:id="rId9"/>
   </p:sldIdLst>
   <p:sldSz cx="12192000" cy="6858000"/>
   <p:notesSz cx="6858000" cy="9144000"/>
@@ -142,7 +143,7 @@
   </p:defaultTextStyle>
   <p:extLst>
     <p:ext uri="{EFAFB233-063F-42B5-8137-9DF3F51BA10A}">
-      <p15:sldGuideLst xmlns="" xmlns:p15="http://schemas.microsoft.com/office/powerpoint/2012/main">
+      <p15:sldGuideLst xmlns:p15="http://schemas.microsoft.com/office/powerpoint/2012/main" xmlns="">
         <p15:guide id="1" orient="horz" pos="2160">
           <p15:clr>
             <a:srgbClr val="A4A3A4"/>
@@ -7052,8 +7053,8 @@
         </p:nvSpPr>
         <p:spPr>
           <a:xfrm>
-            <a:off x="1467060" y="1200509"/>
-            <a:ext cx="10018712" cy="5045016"/>
+            <a:off x="1467060" y="750498"/>
+            <a:ext cx="10018712" cy="6107501"/>
           </a:xfrm>
         </p:spPr>
         <p:txBody>
@@ -7129,8 +7130,38 @@
             <a:pPr lvl="1"/>
             <a:r>
               <a:rPr lang="en-US" dirty="0" smtClean="0"/>
-              <a:t>Linked software to approver with PHP instead of manually typing the INSERT.</a:t>
-            </a:r>
+              <a:t>Linked software to approver with PHP instead of manually typing the INSERT</a:t>
+            </a:r>
+            <a:r>
+              <a:rPr lang="en-US" dirty="0" smtClean="0"/>
+              <a:t>.</a:t>
+            </a:r>
+          </a:p>
+          <a:p>
+            <a:pPr lvl="1"/>
+            <a:endParaRPr lang="en-US" dirty="0"/>
+          </a:p>
+          <a:p>
+            <a:r>
+              <a:rPr lang="en-US" b="1" dirty="0" smtClean="0"/>
+              <a:t>Problems:</a:t>
+            </a:r>
+          </a:p>
+          <a:p>
+            <a:pPr lvl="1"/>
+            <a:r>
+              <a:rPr lang="en-US" dirty="0" smtClean="0"/>
+              <a:t>Assumed that the </a:t>
+            </a:r>
+            <a:r>
+              <a:rPr lang="en-US" dirty="0" err="1" smtClean="0"/>
+              <a:t>myeHealth</a:t>
+            </a:r>
+            <a:r>
+              <a:rPr lang="en-US" dirty="0" smtClean="0"/>
+              <a:t> software is different in each region</a:t>
+            </a:r>
+            <a:endParaRPr lang="en-US" dirty="0" smtClean="0"/>
           </a:p>
         </p:txBody>
       </p:sp>
@@ -7736,6 +7767,156 @@
       </p:grpSpPr>
       <p:sp>
         <p:nvSpPr>
+          <p:cNvPr id="2" name="Title 1"/>
+          <p:cNvSpPr>
+            <a:spLocks noGrp="1"/>
+          </p:cNvSpPr>
+          <p:nvPr>
+            <p:ph type="title"/>
+          </p:nvPr>
+        </p:nvSpPr>
+        <p:spPr>
+          <a:xfrm>
+            <a:off x="0" y="0"/>
+            <a:ext cx="12192000" cy="1138687"/>
+          </a:xfrm>
+        </p:spPr>
+        <p:txBody>
+          <a:bodyPr/>
+          <a:lstStyle/>
+          <a:p>
+            <a:r>
+              <a:rPr lang="en-US" dirty="0" smtClean="0"/>
+              <a:t>With some </a:t>
+            </a:r>
+            <a:r>
+              <a:rPr lang="en-US" dirty="0" err="1" smtClean="0"/>
+              <a:t>Php</a:t>
+            </a:r>
+            <a:r>
+              <a:rPr lang="en-US" dirty="0" smtClean="0"/>
+              <a:t> </a:t>
+            </a:r>
+            <a:r>
+              <a:rPr lang="en-US" dirty="0"/>
+              <a:t>Magic: </a:t>
+            </a:r>
+            <a:r>
+              <a:rPr lang="en-US" dirty="0">
+                <a:hlinkClick r:id="rId2"/>
+              </a:rPr>
+              <a:t>http://142.165.187.167</a:t>
+            </a:r>
+            <a:r>
+              <a:rPr lang="en-US" dirty="0" smtClean="0">
+                <a:hlinkClick r:id="rId2"/>
+              </a:rPr>
+              <a:t>/</a:t>
+            </a:r>
+            <a:r>
+              <a:rPr lang="en-US" dirty="0" smtClean="0"/>
+              <a:t> </a:t>
+            </a:r>
+            <a:endParaRPr lang="en-US" dirty="0"/>
+          </a:p>
+        </p:txBody>
+      </p:sp>
+      <p:pic>
+        <p:nvPicPr>
+          <p:cNvPr id="1027" name="Picture 3"/>
+          <p:cNvPicPr>
+            <a:picLocks noChangeAspect="1" noChangeArrowheads="1"/>
+          </p:cNvPicPr>
+          <p:nvPr/>
+        </p:nvPicPr>
+        <p:blipFill>
+          <a:blip r:embed="rId3">
+            <a:extLst>
+              <a:ext uri="{28A0092B-C50C-407E-A947-70E740481C1C}">
+                <a14:useLocalDpi xmlns:a14="http://schemas.microsoft.com/office/drawing/2010/main" val="0"/>
+              </a:ext>
+            </a:extLst>
+          </a:blip>
+          <a:srcRect/>
+          <a:stretch>
+            <a:fillRect/>
+          </a:stretch>
+        </p:blipFill>
+        <p:spPr bwMode="auto">
+          <a:xfrm>
+            <a:off x="-1" y="996811"/>
+            <a:ext cx="12192001" cy="5861190"/>
+          </a:xfrm>
+          <a:prstGeom prst="rect">
+            <a:avLst/>
+          </a:prstGeom>
+          <a:noFill/>
+          <a:ln>
+            <a:noFill/>
+          </a:ln>
+          <a:effectLst/>
+          <a:extLst>
+            <a:ext uri="{909E8E84-426E-40DD-AFC4-6F175D3DCCD1}">
+              <a14:hiddenFill xmlns:a14="http://schemas.microsoft.com/office/drawing/2010/main">
+                <a:solidFill>
+                  <a:schemeClr val="accent1"/>
+                </a:solidFill>
+              </a14:hiddenFill>
+            </a:ext>
+            <a:ext uri="{91240B29-F687-4F45-9708-019B960494DF}">
+              <a14:hiddenLine xmlns:a14="http://schemas.microsoft.com/office/drawing/2010/main" w="9525">
+                <a:solidFill>
+                  <a:schemeClr val="tx1"/>
+                </a:solidFill>
+                <a:miter lim="800000"/>
+                <a:headEnd/>
+                <a:tailEnd/>
+              </a14:hiddenLine>
+            </a:ext>
+            <a:ext uri="{AF507438-7753-43E0-B8FC-AC1667EBCBE1}">
+              <a14:hiddenEffects xmlns:a14="http://schemas.microsoft.com/office/drawing/2010/main">
+                <a:effectLst>
+                  <a:outerShdw dist="35921" dir="2700000" algn="ctr" rotWithShape="0">
+                    <a:schemeClr val="bg2"/>
+                  </a:outerShdw>
+                </a:effectLst>
+              </a14:hiddenEffects>
+            </a:ext>
+          </a:extLst>
+        </p:spPr>
+      </p:pic>
+    </p:spTree>
+    <p:extLst>
+      <p:ext uri="{BB962C8B-B14F-4D97-AF65-F5344CB8AC3E}">
+        <p14:creationId xmlns:p14="http://schemas.microsoft.com/office/powerpoint/2010/main" val="3099978589"/>
+      </p:ext>
+    </p:extLst>
+  </p:cSld>
+  <p:clrMapOvr>
+    <a:masterClrMapping/>
+  </p:clrMapOvr>
+</p:sld>
+</file>
+
+<file path=ppt/slides/slide6.xml><?xml version="1.0" encoding="utf-8"?>
+<p:sld xmlns:a="http://schemas.openxmlformats.org/drawingml/2006/main" xmlns:r="http://schemas.openxmlformats.org/officeDocument/2006/relationships" xmlns:p="http://schemas.openxmlformats.org/presentationml/2006/main">
+  <p:cSld>
+    <p:spTree>
+      <p:nvGrpSpPr>
+        <p:cNvPr id="1" name=""/>
+        <p:cNvGrpSpPr/>
+        <p:nvPr/>
+      </p:nvGrpSpPr>
+      <p:grpSpPr>
+        <a:xfrm>
+          <a:off x="0" y="0"/>
+          <a:ext cx="0" cy="0"/>
+          <a:chOff x="0" y="0"/>
+          <a:chExt cx="0" cy="0"/>
+        </a:xfrm>
+      </p:grpSpPr>
+      <p:sp>
+        <p:nvSpPr>
           <p:cNvPr id="7170" name="Title 1"/>
           <p:cNvSpPr>
             <a:spLocks noGrp="1" noChangeArrowheads="1"/>
@@ -7878,7 +8059,7 @@
 </p:sld>
 </file>
 
-<file path=ppt/slides/slide6.xml><?xml version="1.0" encoding="utf-8"?>
+<file path=ppt/slides/slide7.xml><?xml version="1.0" encoding="utf-8"?>
 <p:sld xmlns:a="http://schemas.openxmlformats.org/drawingml/2006/main" xmlns:r="http://schemas.openxmlformats.org/officeDocument/2006/relationships" xmlns:p="http://schemas.openxmlformats.org/presentationml/2006/main">
   <p:cSld>
     <p:spTree>
@@ -7936,7 +8117,7 @@
 </p:sld>
 </file>
 
-<file path=ppt/slides/slide7.xml><?xml version="1.0" encoding="utf-8"?>
+<file path=ppt/slides/slide8.xml><?xml version="1.0" encoding="utf-8"?>
 <p:sld xmlns:a="http://schemas.openxmlformats.org/drawingml/2006/main" xmlns:r="http://schemas.openxmlformats.org/officeDocument/2006/relationships" xmlns:p="http://schemas.openxmlformats.org/presentationml/2006/main">
   <p:cSld>
     <p:spTree>
@@ -8365,7 +8546,7 @@
   <a:extraClrSchemeLst/>
   <a:extLst>
     <a:ext uri="{05A4C25C-085E-4340-85A3-A5531E510DB2}">
-      <thm15:themeFamily xmlns="" xmlns:thm15="http://schemas.microsoft.com/office/thememl/2012/main" name="Parallax" id="{3388167B-A2EB-4685-9635-1831D9AEF8C4}" vid="{4F7A876A-7598-49CA-AFC8-8EDA2551E4A7}"/>
+      <thm15:themeFamily xmlns:thm15="http://schemas.microsoft.com/office/thememl/2012/main" xmlns="" name="Parallax" id="{3388167B-A2EB-4685-9635-1831D9AEF8C4}" vid="{4F7A876A-7598-49CA-AFC8-8EDA2551E4A7}"/>
     </a:ext>
   </a:extLst>
 </a:theme>

</xml_diff>